<commit_message>
ppt add one challenge
</commit_message>
<xml_diff>
--- a/PPT.pptx
+++ b/PPT.pptx
@@ -5162,6 +5162,12 @@
             </a:r>
           </a:p>
           <a:p>
+            <a:r>
+              <a:rPr lang="en-CA" dirty="0"/>
+              <a:t>Adapt to Multiple Android Phones &amp; Models</a:t>
+            </a:r>
+          </a:p>
+          <a:p>
             <a:endParaRPr lang="en-CA" dirty="0"/>
           </a:p>
         </p:txBody>

</xml_diff>